<commit_message>
Fixed bugs in blob application
</commit_message>
<xml_diff>
--- a/Azure Blob Storage/Containers/Azure Blob Containers.pptx
+++ b/Azure Blob Storage/Containers/Azure Blob Containers.pptx
@@ -6943,7 +6943,15 @@
             </a:pPr>
             <a:r>
               <a:rPr lang="en-US" sz="3600" dirty="0"/>
-              <a:t>Azure Storage Queue supports 6 replication levels with SLA ranging from 99.99999999999% (11 9s) to 99.9999999999999999% (16 9s) availability of your data.</a:t>
+              <a:t>Azure </a:t>
+            </a:r>
+            <a:r>
+              <a:rPr lang="en-US" sz="3600"/>
+              <a:t>Blob Storage supports </a:t>
+            </a:r>
+            <a:r>
+              <a:rPr lang="en-US" sz="3600" dirty="0"/>
+              <a:t>6 replication levels with SLA ranging from 99.99999999999% (11 9s) to 99.9999999999999999% (16 9s) availability of your data.</a:t>
             </a:r>
           </a:p>
           <a:p>

</xml_diff>